<commit_message>
Added hand written letters to demo letter ppt
</commit_message>
<xml_diff>
--- a/Offender-Mail-Processing/demo/SampleLetters.pptx
+++ b/Offender-Mail-Processing/demo/SampleLetters.pptx
@@ -18,6 +18,9 @@
     <p:sldId id="267" r:id="rId12"/>
     <p:sldId id="268" r:id="rId13"/>
     <p:sldId id="269" r:id="rId14"/>
+    <p:sldId id="270" r:id="rId15"/>
+    <p:sldId id="271" r:id="rId16"/>
+    <p:sldId id="272" r:id="rId17"/>
   </p:sldIdLst>
   <p:sldSz cx="12192000" cy="6858000"/>
   <p:notesSz cx="6858000" cy="9144000"/>
@@ -3766,6 +3769,217 @@
 </p:sld>
 </file>
 
+<file path=ppt/slides/slide14.xml><?xml version="1.0" encoding="utf-8"?>
+<p:sld xmlns:a="http://schemas.openxmlformats.org/drawingml/2006/main" xmlns:r="http://schemas.openxmlformats.org/officeDocument/2006/relationships" xmlns:p="http://schemas.openxmlformats.org/presentationml/2006/main">
+  <p:cSld>
+    <p:bg>
+      <p:bgPr>
+        <a:solidFill>
+          <a:schemeClr val="tx1">
+            <a:lumMod val="65000"/>
+            <a:lumOff val="35000"/>
+          </a:schemeClr>
+        </a:solidFill>
+        <a:effectLst/>
+      </p:bgPr>
+    </p:bg>
+    <p:spTree>
+      <p:nvGrpSpPr>
+        <p:cNvPr id="1" name=""/>
+        <p:cNvGrpSpPr/>
+        <p:nvPr/>
+      </p:nvGrpSpPr>
+      <p:grpSpPr>
+        <a:xfrm>
+          <a:off x="0" y="0"/>
+          <a:ext cx="0" cy="0"/>
+          <a:chOff x="0" y="0"/>
+          <a:chExt cx="0" cy="0"/>
+        </a:xfrm>
+      </p:grpSpPr>
+      <p:sp>
+        <p:nvSpPr>
+          <p:cNvPr id="2" name="TextBox 1">
+            <a:extLst>
+              <a:ext uri="{FF2B5EF4-FFF2-40B4-BE49-F238E27FC236}">
+                <a16:creationId xmlns:a16="http://schemas.microsoft.com/office/drawing/2014/main" id="{6A6DA0F6-C234-4079-88D9-2A873EE55B6E}"/>
+              </a:ext>
+            </a:extLst>
+          </p:cNvPr>
+          <p:cNvSpPr txBox="1"/>
+          <p:nvPr/>
+        </p:nvSpPr>
+        <p:spPr>
+          <a:xfrm>
+            <a:off x="0" y="3044279"/>
+            <a:ext cx="12192000" cy="769441"/>
+          </a:xfrm>
+          <a:prstGeom prst="rect">
+            <a:avLst/>
+          </a:prstGeom>
+          <a:noFill/>
+        </p:spPr>
+        <p:txBody>
+          <a:bodyPr wrap="square" rtlCol="0">
+            <a:spAutoFit/>
+          </a:bodyPr>
+          <a:lstStyle/>
+          <a:p>
+            <a:pPr algn="ctr"/>
+            <a:r>
+              <a:rPr lang="en-US" sz="4400" dirty="0">
+                <a:solidFill>
+                  <a:schemeClr val="bg1"/>
+                </a:solidFill>
+              </a:rPr>
+              <a:t>Hand Written</a:t>
+            </a:r>
+          </a:p>
+        </p:txBody>
+      </p:sp>
+    </p:spTree>
+    <p:extLst>
+      <p:ext uri="{BB962C8B-B14F-4D97-AF65-F5344CB8AC3E}">
+        <p14:creationId xmlns:p14="http://schemas.microsoft.com/office/powerpoint/2010/main" val="4864119"/>
+      </p:ext>
+    </p:extLst>
+  </p:cSld>
+  <p:clrMapOvr>
+    <a:masterClrMapping/>
+  </p:clrMapOvr>
+</p:sld>
+</file>
+
+<file path=ppt/slides/slide15.xml><?xml version="1.0" encoding="utf-8"?>
+<p:sld xmlns:a="http://schemas.openxmlformats.org/drawingml/2006/main" xmlns:r="http://schemas.openxmlformats.org/officeDocument/2006/relationships" xmlns:p="http://schemas.openxmlformats.org/presentationml/2006/main">
+  <p:cSld>
+    <p:spTree>
+      <p:nvGrpSpPr>
+        <p:cNvPr id="1" name=""/>
+        <p:cNvGrpSpPr/>
+        <p:nvPr/>
+      </p:nvGrpSpPr>
+      <p:grpSpPr>
+        <a:xfrm>
+          <a:off x="0" y="0"/>
+          <a:ext cx="0" cy="0"/>
+          <a:chOff x="0" y="0"/>
+          <a:chExt cx="0" cy="0"/>
+        </a:xfrm>
+      </p:grpSpPr>
+      <p:pic>
+        <p:nvPicPr>
+          <p:cNvPr id="3" name="Picture 2" descr="Table&#10;&#10;Description automatically generated">
+            <a:extLst>
+              <a:ext uri="{FF2B5EF4-FFF2-40B4-BE49-F238E27FC236}">
+                <a16:creationId xmlns:a16="http://schemas.microsoft.com/office/drawing/2014/main" id="{58EA3EDE-01B4-466B-AE0A-8AEB31050B3A}"/>
+              </a:ext>
+            </a:extLst>
+          </p:cNvPr>
+          <p:cNvPicPr>
+            <a:picLocks noChangeAspect="1"/>
+          </p:cNvPicPr>
+          <p:nvPr/>
+        </p:nvPicPr>
+        <p:blipFill rotWithShape="1">
+          <a:blip r:embed="rId2">
+            <a:extLst>
+              <a:ext uri="{28A0092B-C50C-407E-A947-70E740481C1C}">
+                <a14:useLocalDpi xmlns:a14="http://schemas.microsoft.com/office/drawing/2010/main" val="0"/>
+              </a:ext>
+            </a:extLst>
+          </a:blip>
+          <a:srcRect l="14457" r="15903" b="17400"/>
+          <a:stretch/>
+        </p:blipFill>
+        <p:spPr>
+          <a:xfrm rot="5400000">
+            <a:off x="2871522" y="-1366839"/>
+            <a:ext cx="6248932" cy="9591678"/>
+          </a:xfrm>
+          <a:prstGeom prst="rect">
+            <a:avLst/>
+          </a:prstGeom>
+        </p:spPr>
+      </p:pic>
+    </p:spTree>
+    <p:extLst>
+      <p:ext uri="{BB962C8B-B14F-4D97-AF65-F5344CB8AC3E}">
+        <p14:creationId xmlns:p14="http://schemas.microsoft.com/office/powerpoint/2010/main" val="801539241"/>
+      </p:ext>
+    </p:extLst>
+  </p:cSld>
+  <p:clrMapOvr>
+    <a:masterClrMapping/>
+  </p:clrMapOvr>
+</p:sld>
+</file>
+
+<file path=ppt/slides/slide16.xml><?xml version="1.0" encoding="utf-8"?>
+<p:sld xmlns:a="http://schemas.openxmlformats.org/drawingml/2006/main" xmlns:r="http://schemas.openxmlformats.org/officeDocument/2006/relationships" xmlns:p="http://schemas.openxmlformats.org/presentationml/2006/main">
+  <p:cSld>
+    <p:spTree>
+      <p:nvGrpSpPr>
+        <p:cNvPr id="1" name=""/>
+        <p:cNvGrpSpPr/>
+        <p:nvPr/>
+      </p:nvGrpSpPr>
+      <p:grpSpPr>
+        <a:xfrm>
+          <a:off x="0" y="0"/>
+          <a:ext cx="0" cy="0"/>
+          <a:chOff x="0" y="0"/>
+          <a:chExt cx="0" cy="0"/>
+        </a:xfrm>
+      </p:grpSpPr>
+      <p:pic>
+        <p:nvPicPr>
+          <p:cNvPr id="3" name="Picture 2" descr="Table&#10;&#10;Description automatically generated with low confidence">
+            <a:extLst>
+              <a:ext uri="{FF2B5EF4-FFF2-40B4-BE49-F238E27FC236}">
+                <a16:creationId xmlns:a16="http://schemas.microsoft.com/office/drawing/2014/main" id="{C0ECB02D-4591-44D0-BB72-1E8B2FB04E4D}"/>
+              </a:ext>
+            </a:extLst>
+          </p:cNvPr>
+          <p:cNvPicPr>
+            <a:picLocks noChangeAspect="1"/>
+          </p:cNvPicPr>
+          <p:nvPr/>
+        </p:nvPicPr>
+        <p:blipFill rotWithShape="1">
+          <a:blip r:embed="rId2">
+            <a:extLst>
+              <a:ext uri="{28A0092B-C50C-407E-A947-70E740481C1C}">
+                <a14:useLocalDpi xmlns:a14="http://schemas.microsoft.com/office/drawing/2010/main" val="0"/>
+              </a:ext>
+            </a:extLst>
+          </a:blip>
+          <a:srcRect l="11441" r="26728" b="4898"/>
+          <a:stretch/>
+        </p:blipFill>
+        <p:spPr>
+          <a:xfrm rot="5400000">
+            <a:off x="3073763" y="-2154603"/>
+            <a:ext cx="5610225" cy="11167205"/>
+          </a:xfrm>
+          <a:prstGeom prst="rect">
+            <a:avLst/>
+          </a:prstGeom>
+        </p:spPr>
+      </p:pic>
+    </p:spTree>
+    <p:extLst>
+      <p:ext uri="{BB962C8B-B14F-4D97-AF65-F5344CB8AC3E}">
+        <p14:creationId xmlns:p14="http://schemas.microsoft.com/office/powerpoint/2010/main" val="3120295851"/>
+      </p:ext>
+    </p:extLst>
+  </p:cSld>
+  <p:clrMapOvr>
+    <a:masterClrMapping/>
+  </p:clrMapOvr>
+</p:sld>
+</file>
+
 <file path=ppt/slides/slide2.xml><?xml version="1.0" encoding="utf-8"?>
 <p:sld xmlns:a="http://schemas.openxmlformats.org/drawingml/2006/main" xmlns:r="http://schemas.openxmlformats.org/officeDocument/2006/relationships" xmlns:p="http://schemas.openxmlformats.org/presentationml/2006/main">
   <p:cSld>

</xml_diff>